<commit_message>
some updates to CV. Can't remember what.
</commit_message>
<xml_diff>
--- a/src/CV_AlexYates_EMEA.pptx
+++ b/src/CV_AlexYates_EMEA.pptx
@@ -241,7 +241,7 @@
           <a:p>
             <a:fld id="{335876D0-9B75-44B5-9404-8FDAD3FB5281}" type="datetimeFigureOut">
               <a:rPr lang="en-GB" smtClean="0"/>
-              <a:t>26/05/2022</a:t>
+              <a:t>27/05/2022</a:t>
             </a:fld>
             <a:endParaRPr lang="en-GB"/>
           </a:p>
@@ -411,7 +411,7 @@
           <a:p>
             <a:fld id="{335876D0-9B75-44B5-9404-8FDAD3FB5281}" type="datetimeFigureOut">
               <a:rPr lang="en-GB" smtClean="0"/>
-              <a:t>26/05/2022</a:t>
+              <a:t>27/05/2022</a:t>
             </a:fld>
             <a:endParaRPr lang="en-GB"/>
           </a:p>
@@ -591,7 +591,7 @@
           <a:p>
             <a:fld id="{335876D0-9B75-44B5-9404-8FDAD3FB5281}" type="datetimeFigureOut">
               <a:rPr lang="en-GB" smtClean="0"/>
-              <a:t>26/05/2022</a:t>
+              <a:t>27/05/2022</a:t>
             </a:fld>
             <a:endParaRPr lang="en-GB"/>
           </a:p>
@@ -767,7 +767,7 @@
           <a:p>
             <a:fld id="{335876D0-9B75-44B5-9404-8FDAD3FB5281}" type="datetimeFigureOut">
               <a:rPr lang="en-GB" smtClean="0"/>
-              <a:t>26/05/2022</a:t>
+              <a:t>27/05/2022</a:t>
             </a:fld>
             <a:endParaRPr lang="en-GB"/>
           </a:p>
@@ -1011,7 +1011,7 @@
           <a:p>
             <a:fld id="{335876D0-9B75-44B5-9404-8FDAD3FB5281}" type="datetimeFigureOut">
               <a:rPr lang="en-GB" smtClean="0"/>
-              <a:t>26/05/2022</a:t>
+              <a:t>27/05/2022</a:t>
             </a:fld>
             <a:endParaRPr lang="en-GB"/>
           </a:p>
@@ -1243,7 +1243,7 @@
           <a:p>
             <a:fld id="{335876D0-9B75-44B5-9404-8FDAD3FB5281}" type="datetimeFigureOut">
               <a:rPr lang="en-GB" smtClean="0"/>
-              <a:t>26/05/2022</a:t>
+              <a:t>27/05/2022</a:t>
             </a:fld>
             <a:endParaRPr lang="en-GB"/>
           </a:p>
@@ -1610,7 +1610,7 @@
           <a:p>
             <a:fld id="{335876D0-9B75-44B5-9404-8FDAD3FB5281}" type="datetimeFigureOut">
               <a:rPr lang="en-GB" smtClean="0"/>
-              <a:t>26/05/2022</a:t>
+              <a:t>27/05/2022</a:t>
             </a:fld>
             <a:endParaRPr lang="en-GB"/>
           </a:p>
@@ -1728,7 +1728,7 @@
           <a:p>
             <a:fld id="{335876D0-9B75-44B5-9404-8FDAD3FB5281}" type="datetimeFigureOut">
               <a:rPr lang="en-GB" smtClean="0"/>
-              <a:t>26/05/2022</a:t>
+              <a:t>27/05/2022</a:t>
             </a:fld>
             <a:endParaRPr lang="en-GB"/>
           </a:p>
@@ -1823,7 +1823,7 @@
           <a:p>
             <a:fld id="{335876D0-9B75-44B5-9404-8FDAD3FB5281}" type="datetimeFigureOut">
               <a:rPr lang="en-GB" smtClean="0"/>
-              <a:t>26/05/2022</a:t>
+              <a:t>27/05/2022</a:t>
             </a:fld>
             <a:endParaRPr lang="en-GB"/>
           </a:p>
@@ -2100,7 +2100,7 @@
           <a:p>
             <a:fld id="{335876D0-9B75-44B5-9404-8FDAD3FB5281}" type="datetimeFigureOut">
               <a:rPr lang="en-GB" smtClean="0"/>
-              <a:t>26/05/2022</a:t>
+              <a:t>27/05/2022</a:t>
             </a:fld>
             <a:endParaRPr lang="en-GB"/>
           </a:p>
@@ -2357,7 +2357,7 @@
           <a:p>
             <a:fld id="{335876D0-9B75-44B5-9404-8FDAD3FB5281}" type="datetimeFigureOut">
               <a:rPr lang="en-GB" smtClean="0"/>
-              <a:t>26/05/2022</a:t>
+              <a:t>27/05/2022</a:t>
             </a:fld>
             <a:endParaRPr lang="en-GB"/>
           </a:p>
@@ -2570,7 +2570,7 @@
           <a:p>
             <a:fld id="{335876D0-9B75-44B5-9404-8FDAD3FB5281}" type="datetimeFigureOut">
               <a:rPr lang="en-GB" smtClean="0"/>
-              <a:t>26/05/2022</a:t>
+              <a:t>27/05/2022</a:t>
             </a:fld>
             <a:endParaRPr lang="en-GB"/>
           </a:p>
@@ -6653,9 +6653,7 @@
           <a:prstGeom prst="ellipse">
             <a:avLst/>
           </a:prstGeom>
-          <a:solidFill>
-            <a:schemeClr val="bg1"/>
-          </a:solidFill>
+          <a:noFill/>
           <a:ln>
             <a:solidFill>
               <a:schemeClr val="bg1"/>
@@ -9397,7 +9395,7 @@
           </p:blipFill>
           <p:spPr>
             <a:xfrm>
-              <a:off x="4943360" y="8265143"/>
+              <a:off x="4943360" y="8267524"/>
               <a:ext cx="157375" cy="94631"/>
             </a:xfrm>
             <a:prstGeom prst="rect">

</xml_diff>

<commit_message>
Updated based on feedback from Sjors, Grant and Alex W.
</commit_message>
<xml_diff>
--- a/src/CV_AlexYates_EMEA.pptx
+++ b/src/CV_AlexYates_EMEA.pptx
@@ -242,7 +242,7 @@
           <a:p>
             <a:fld id="{335876D0-9B75-44B5-9404-8FDAD3FB5281}" type="datetimeFigureOut">
               <a:rPr lang="en-GB" smtClean="0"/>
-              <a:t>07/11/2022</a:t>
+              <a:t>08/11/2022</a:t>
             </a:fld>
             <a:endParaRPr lang="en-GB"/>
           </a:p>
@@ -412,7 +412,7 @@
           <a:p>
             <a:fld id="{335876D0-9B75-44B5-9404-8FDAD3FB5281}" type="datetimeFigureOut">
               <a:rPr lang="en-GB" smtClean="0"/>
-              <a:t>07/11/2022</a:t>
+              <a:t>08/11/2022</a:t>
             </a:fld>
             <a:endParaRPr lang="en-GB"/>
           </a:p>
@@ -592,7 +592,7 @@
           <a:p>
             <a:fld id="{335876D0-9B75-44B5-9404-8FDAD3FB5281}" type="datetimeFigureOut">
               <a:rPr lang="en-GB" smtClean="0"/>
-              <a:t>07/11/2022</a:t>
+              <a:t>08/11/2022</a:t>
             </a:fld>
             <a:endParaRPr lang="en-GB"/>
           </a:p>
@@ -768,7 +768,7 @@
           <a:p>
             <a:fld id="{335876D0-9B75-44B5-9404-8FDAD3FB5281}" type="datetimeFigureOut">
               <a:rPr lang="en-GB" smtClean="0"/>
-              <a:t>07/11/2022</a:t>
+              <a:t>08/11/2022</a:t>
             </a:fld>
             <a:endParaRPr lang="en-GB"/>
           </a:p>
@@ -1012,7 +1012,7 @@
           <a:p>
             <a:fld id="{335876D0-9B75-44B5-9404-8FDAD3FB5281}" type="datetimeFigureOut">
               <a:rPr lang="en-GB" smtClean="0"/>
-              <a:t>07/11/2022</a:t>
+              <a:t>08/11/2022</a:t>
             </a:fld>
             <a:endParaRPr lang="en-GB"/>
           </a:p>
@@ -1244,7 +1244,7 @@
           <a:p>
             <a:fld id="{335876D0-9B75-44B5-9404-8FDAD3FB5281}" type="datetimeFigureOut">
               <a:rPr lang="en-GB" smtClean="0"/>
-              <a:t>07/11/2022</a:t>
+              <a:t>08/11/2022</a:t>
             </a:fld>
             <a:endParaRPr lang="en-GB"/>
           </a:p>
@@ -1611,7 +1611,7 @@
           <a:p>
             <a:fld id="{335876D0-9B75-44B5-9404-8FDAD3FB5281}" type="datetimeFigureOut">
               <a:rPr lang="en-GB" smtClean="0"/>
-              <a:t>07/11/2022</a:t>
+              <a:t>08/11/2022</a:t>
             </a:fld>
             <a:endParaRPr lang="en-GB"/>
           </a:p>
@@ -1729,7 +1729,7 @@
           <a:p>
             <a:fld id="{335876D0-9B75-44B5-9404-8FDAD3FB5281}" type="datetimeFigureOut">
               <a:rPr lang="en-GB" smtClean="0"/>
-              <a:t>07/11/2022</a:t>
+              <a:t>08/11/2022</a:t>
             </a:fld>
             <a:endParaRPr lang="en-GB"/>
           </a:p>
@@ -1824,7 +1824,7 @@
           <a:p>
             <a:fld id="{335876D0-9B75-44B5-9404-8FDAD3FB5281}" type="datetimeFigureOut">
               <a:rPr lang="en-GB" smtClean="0"/>
-              <a:t>07/11/2022</a:t>
+              <a:t>08/11/2022</a:t>
             </a:fld>
             <a:endParaRPr lang="en-GB"/>
           </a:p>
@@ -2101,7 +2101,7 @@
           <a:p>
             <a:fld id="{335876D0-9B75-44B5-9404-8FDAD3FB5281}" type="datetimeFigureOut">
               <a:rPr lang="en-GB" smtClean="0"/>
-              <a:t>07/11/2022</a:t>
+              <a:t>08/11/2022</a:t>
             </a:fld>
             <a:endParaRPr lang="en-GB"/>
           </a:p>
@@ -2358,7 +2358,7 @@
           <a:p>
             <a:fld id="{335876D0-9B75-44B5-9404-8FDAD3FB5281}" type="datetimeFigureOut">
               <a:rPr lang="en-GB" smtClean="0"/>
-              <a:t>07/11/2022</a:t>
+              <a:t>08/11/2022</a:t>
             </a:fld>
             <a:endParaRPr lang="en-GB"/>
           </a:p>
@@ -2571,7 +2571,7 @@
           <a:p>
             <a:fld id="{335876D0-9B75-44B5-9404-8FDAD3FB5281}" type="datetimeFigureOut">
               <a:rPr lang="en-GB" smtClean="0"/>
-              <a:t>07/11/2022</a:t>
+              <a:t>08/11/2022</a:t>
             </a:fld>
             <a:endParaRPr lang="en-GB"/>
           </a:p>
@@ -8624,7 +8624,7 @@
                   <a:srgbClr val="262F3B"/>
                 </a:solidFill>
               </a:rPr>
-              <a:t>Doubled revenue in 12 months. Tripled revenue 36 months.</a:t>
+              <a:t>Doubled revenue in 12 months. Tripled revenue in 36 months.</a:t>
             </a:r>
           </a:p>
           <a:p>
@@ -9689,7 +9689,7 @@
                   </a:solidFill>
                   <a:effectLst/>
                 </a:rPr>
-                <a:t>, PASS President, Redgate</a:t>
+                <a:t>, Dev Advocate, Redgate</a:t>
               </a:r>
               <a:endParaRPr lang="en-GB" sz="1000" dirty="0">
                 <a:solidFill>
@@ -10936,7 +10936,23 @@
                     <a:srgbClr val="F6AB25"/>
                   </a:solidFill>
                 </a:rPr>
-                <a:t>, Senior DBA, </a:t>
+                <a:t>, </a:t>
+              </a:r>
+              <a:r>
+                <a:rPr lang="en-GB" sz="900" dirty="0">
+                  <a:solidFill>
+                    <a:srgbClr val="F6AB25"/>
+                  </a:solidFill>
+                </a:rPr>
+                <a:t>DBA/Customer</a:t>
+              </a:r>
+              <a:r>
+                <a:rPr lang="en-GB" sz="1000" dirty="0">
+                  <a:solidFill>
+                    <a:srgbClr val="F6AB25"/>
+                  </a:solidFill>
+                </a:rPr>
+                <a:t>, </a:t>
               </a:r>
               <a:r>
                 <a:rPr lang="en-GB" sz="1000" dirty="0" err="1">

</xml_diff>

<commit_message>
Updating git tree screenshots with typo fixes
</commit_message>
<xml_diff>
--- a/src/CV_AlexYates_EMEA.pptx
+++ b/src/CV_AlexYates_EMEA.pptx
@@ -242,7 +242,7 @@
           <a:p>
             <a:fld id="{335876D0-9B75-44B5-9404-8FDAD3FB5281}" type="datetimeFigureOut">
               <a:rPr lang="en-GB" smtClean="0"/>
-              <a:t>08/11/2022</a:t>
+              <a:t>10/11/2022</a:t>
             </a:fld>
             <a:endParaRPr lang="en-GB"/>
           </a:p>
@@ -412,7 +412,7 @@
           <a:p>
             <a:fld id="{335876D0-9B75-44B5-9404-8FDAD3FB5281}" type="datetimeFigureOut">
               <a:rPr lang="en-GB" smtClean="0"/>
-              <a:t>08/11/2022</a:t>
+              <a:t>10/11/2022</a:t>
             </a:fld>
             <a:endParaRPr lang="en-GB"/>
           </a:p>
@@ -592,7 +592,7 @@
           <a:p>
             <a:fld id="{335876D0-9B75-44B5-9404-8FDAD3FB5281}" type="datetimeFigureOut">
               <a:rPr lang="en-GB" smtClean="0"/>
-              <a:t>08/11/2022</a:t>
+              <a:t>10/11/2022</a:t>
             </a:fld>
             <a:endParaRPr lang="en-GB"/>
           </a:p>
@@ -768,7 +768,7 @@
           <a:p>
             <a:fld id="{335876D0-9B75-44B5-9404-8FDAD3FB5281}" type="datetimeFigureOut">
               <a:rPr lang="en-GB" smtClean="0"/>
-              <a:t>08/11/2022</a:t>
+              <a:t>10/11/2022</a:t>
             </a:fld>
             <a:endParaRPr lang="en-GB"/>
           </a:p>
@@ -1012,7 +1012,7 @@
           <a:p>
             <a:fld id="{335876D0-9B75-44B5-9404-8FDAD3FB5281}" type="datetimeFigureOut">
               <a:rPr lang="en-GB" smtClean="0"/>
-              <a:t>08/11/2022</a:t>
+              <a:t>10/11/2022</a:t>
             </a:fld>
             <a:endParaRPr lang="en-GB"/>
           </a:p>
@@ -1244,7 +1244,7 @@
           <a:p>
             <a:fld id="{335876D0-9B75-44B5-9404-8FDAD3FB5281}" type="datetimeFigureOut">
               <a:rPr lang="en-GB" smtClean="0"/>
-              <a:t>08/11/2022</a:t>
+              <a:t>10/11/2022</a:t>
             </a:fld>
             <a:endParaRPr lang="en-GB"/>
           </a:p>
@@ -1611,7 +1611,7 @@
           <a:p>
             <a:fld id="{335876D0-9B75-44B5-9404-8FDAD3FB5281}" type="datetimeFigureOut">
               <a:rPr lang="en-GB" smtClean="0"/>
-              <a:t>08/11/2022</a:t>
+              <a:t>10/11/2022</a:t>
             </a:fld>
             <a:endParaRPr lang="en-GB"/>
           </a:p>
@@ -1729,7 +1729,7 @@
           <a:p>
             <a:fld id="{335876D0-9B75-44B5-9404-8FDAD3FB5281}" type="datetimeFigureOut">
               <a:rPr lang="en-GB" smtClean="0"/>
-              <a:t>08/11/2022</a:t>
+              <a:t>10/11/2022</a:t>
             </a:fld>
             <a:endParaRPr lang="en-GB"/>
           </a:p>
@@ -1824,7 +1824,7 @@
           <a:p>
             <a:fld id="{335876D0-9B75-44B5-9404-8FDAD3FB5281}" type="datetimeFigureOut">
               <a:rPr lang="en-GB" smtClean="0"/>
-              <a:t>08/11/2022</a:t>
+              <a:t>10/11/2022</a:t>
             </a:fld>
             <a:endParaRPr lang="en-GB"/>
           </a:p>
@@ -2101,7 +2101,7 @@
           <a:p>
             <a:fld id="{335876D0-9B75-44B5-9404-8FDAD3FB5281}" type="datetimeFigureOut">
               <a:rPr lang="en-GB" smtClean="0"/>
-              <a:t>08/11/2022</a:t>
+              <a:t>10/11/2022</a:t>
             </a:fld>
             <a:endParaRPr lang="en-GB"/>
           </a:p>
@@ -2358,7 +2358,7 @@
           <a:p>
             <a:fld id="{335876D0-9B75-44B5-9404-8FDAD3FB5281}" type="datetimeFigureOut">
               <a:rPr lang="en-GB" smtClean="0"/>
-              <a:t>08/11/2022</a:t>
+              <a:t>10/11/2022</a:t>
             </a:fld>
             <a:endParaRPr lang="en-GB"/>
           </a:p>
@@ -2571,7 +2571,7 @@
           <a:p>
             <a:fld id="{335876D0-9B75-44B5-9404-8FDAD3FB5281}" type="datetimeFigureOut">
               <a:rPr lang="en-GB" smtClean="0"/>
-              <a:t>08/11/2022</a:t>
+              <a:t>10/11/2022</a:t>
             </a:fld>
             <a:endParaRPr lang="en-GB"/>
           </a:p>
@@ -2976,234 +2976,6 @@
           <a:chExt cx="0" cy="0"/>
         </a:xfrm>
       </p:grpSpPr>
-      <p:grpSp>
-        <p:nvGrpSpPr>
-          <p:cNvPr id="22" name="Group 21">
-            <a:extLst>
-              <a:ext uri="{FF2B5EF4-FFF2-40B4-BE49-F238E27FC236}">
-                <a16:creationId xmlns:a16="http://schemas.microsoft.com/office/drawing/2014/main" id="{DF3FA1CA-E07B-6663-BD82-E82B0EF986DF}"/>
-              </a:ext>
-            </a:extLst>
-          </p:cNvPr>
-          <p:cNvGrpSpPr/>
-          <p:nvPr/>
-        </p:nvGrpSpPr>
-        <p:grpSpPr>
-          <a:xfrm>
-            <a:off x="2398500" y="4938717"/>
-            <a:ext cx="4271935" cy="4462893"/>
-            <a:chOff x="2550912" y="4795832"/>
-            <a:chExt cx="4271935" cy="4462893"/>
-          </a:xfrm>
-        </p:grpSpPr>
-        <p:pic>
-          <p:nvPicPr>
-            <p:cNvPr id="20" name="Picture 19">
-              <a:extLst>
-                <a:ext uri="{FF2B5EF4-FFF2-40B4-BE49-F238E27FC236}">
-                  <a16:creationId xmlns:a16="http://schemas.microsoft.com/office/drawing/2014/main" id="{0BF159B5-5A4C-9F9A-294D-710289456027}"/>
-                </a:ext>
-              </a:extLst>
-            </p:cNvPr>
-            <p:cNvPicPr>
-              <a:picLocks noChangeAspect="1"/>
-            </p:cNvPicPr>
-            <p:nvPr/>
-          </p:nvPicPr>
-          <p:blipFill rotWithShape="1">
-            <a:blip r:embed="rId2"/>
-            <a:srcRect l="64" t="48489" r="81799"/>
-            <a:stretch/>
-          </p:blipFill>
-          <p:spPr>
-            <a:xfrm>
-              <a:off x="2550912" y="6934189"/>
-              <a:ext cx="801888" cy="2323755"/>
-            </a:xfrm>
-            <a:prstGeom prst="rect">
-              <a:avLst/>
-            </a:prstGeom>
-          </p:spPr>
-        </p:pic>
-        <p:pic>
-          <p:nvPicPr>
-            <p:cNvPr id="229" name="Picture 228" descr="A picture containing graphical user interface&#10;&#10;Description automatically generated">
-              <a:extLst>
-                <a:ext uri="{FF2B5EF4-FFF2-40B4-BE49-F238E27FC236}">
-                  <a16:creationId xmlns:a16="http://schemas.microsoft.com/office/drawing/2014/main" id="{1261B3D0-08BF-550A-447F-24233F77BB43}"/>
-                </a:ext>
-              </a:extLst>
-            </p:cNvPr>
-            <p:cNvPicPr>
-              <a:picLocks noChangeAspect="1"/>
-            </p:cNvPicPr>
-            <p:nvPr/>
-          </p:nvPicPr>
-          <p:blipFill rotWithShape="1">
-            <a:blip r:embed="rId3">
-              <a:extLst>
-                <a:ext uri="{28A0092B-C50C-407E-A947-70E740481C1C}">
-                  <a14:useLocalDpi xmlns:a14="http://schemas.microsoft.com/office/drawing/2010/main" val="0"/>
-                </a:ext>
-              </a:extLst>
-            </a:blip>
-            <a:srcRect l="62942" t="73941" r="36058" b="24743"/>
-            <a:stretch/>
-          </p:blipFill>
-          <p:spPr>
-            <a:xfrm>
-              <a:off x="5061502" y="8213789"/>
-              <a:ext cx="45719" cy="62481"/>
-            </a:xfrm>
-            <a:prstGeom prst="rect">
-              <a:avLst/>
-            </a:prstGeom>
-          </p:spPr>
-        </p:pic>
-        <p:pic>
-          <p:nvPicPr>
-            <p:cNvPr id="230" name="Picture 229" descr="A picture containing graphical user interface&#10;&#10;Description automatically generated">
-              <a:extLst>
-                <a:ext uri="{FF2B5EF4-FFF2-40B4-BE49-F238E27FC236}">
-                  <a16:creationId xmlns:a16="http://schemas.microsoft.com/office/drawing/2014/main" id="{141FE177-05BE-8E33-61D2-3C4D6CB30E6A}"/>
-                </a:ext>
-              </a:extLst>
-            </p:cNvPr>
-            <p:cNvPicPr>
-              <a:picLocks noChangeAspect="1"/>
-            </p:cNvPicPr>
-            <p:nvPr/>
-          </p:nvPicPr>
-          <p:blipFill rotWithShape="1">
-            <a:blip r:embed="rId3">
-              <a:extLst>
-                <a:ext uri="{28A0092B-C50C-407E-A947-70E740481C1C}">
-                  <a14:useLocalDpi xmlns:a14="http://schemas.microsoft.com/office/drawing/2010/main" val="0"/>
-                </a:ext>
-              </a:extLst>
-            </a:blip>
-            <a:srcRect l="85817" t="82311" r="8038" b="15181"/>
-            <a:stretch/>
-          </p:blipFill>
-          <p:spPr>
-            <a:xfrm>
-              <a:off x="4935929" y="8266222"/>
-              <a:ext cx="162718" cy="97844"/>
-            </a:xfrm>
-            <a:prstGeom prst="rect">
-              <a:avLst/>
-            </a:prstGeom>
-          </p:spPr>
-        </p:pic>
-        <p:grpSp>
-          <p:nvGrpSpPr>
-            <p:cNvPr id="10" name="Group 9">
-              <a:extLst>
-                <a:ext uri="{FF2B5EF4-FFF2-40B4-BE49-F238E27FC236}">
-                  <a16:creationId xmlns:a16="http://schemas.microsoft.com/office/drawing/2014/main" id="{A6DACB01-2564-1083-FB66-89554499986C}"/>
-                </a:ext>
-              </a:extLst>
-            </p:cNvPr>
-            <p:cNvGrpSpPr/>
-            <p:nvPr/>
-          </p:nvGrpSpPr>
-          <p:grpSpPr>
-            <a:xfrm>
-              <a:off x="3352800" y="4798218"/>
-              <a:ext cx="3470047" cy="4460507"/>
-              <a:chOff x="3400789" y="4680520"/>
-              <a:chExt cx="3470047" cy="4460507"/>
-            </a:xfrm>
-          </p:grpSpPr>
-          <p:pic>
-            <p:nvPicPr>
-              <p:cNvPr id="9" name="Picture 8">
-                <a:extLst>
-                  <a:ext uri="{FF2B5EF4-FFF2-40B4-BE49-F238E27FC236}">
-                    <a16:creationId xmlns:a16="http://schemas.microsoft.com/office/drawing/2014/main" id="{8DE4B569-3D89-5D07-132B-A52F9B90CC49}"/>
-                  </a:ext>
-                </a:extLst>
-              </p:cNvPr>
-              <p:cNvPicPr>
-                <a:picLocks noChangeAspect="1"/>
-              </p:cNvPicPr>
-              <p:nvPr/>
-            </p:nvPicPr>
-            <p:blipFill rotWithShape="1">
-              <a:blip r:embed="rId2"/>
-              <a:srcRect l="21516" t="1123"/>
-              <a:stretch/>
-            </p:blipFill>
-            <p:spPr>
-              <a:xfrm>
-                <a:off x="3400789" y="4680520"/>
-                <a:ext cx="3470047" cy="4460507"/>
-              </a:xfrm>
-              <a:prstGeom prst="rect">
-                <a:avLst/>
-              </a:prstGeom>
-            </p:spPr>
-          </p:pic>
-          <p:pic>
-            <p:nvPicPr>
-              <p:cNvPr id="7" name="Picture 6">
-                <a:extLst>
-                  <a:ext uri="{FF2B5EF4-FFF2-40B4-BE49-F238E27FC236}">
-                    <a16:creationId xmlns:a16="http://schemas.microsoft.com/office/drawing/2014/main" id="{5D4AED1A-2364-FCB4-856C-0885DD701AAD}"/>
-                  </a:ext>
-                </a:extLst>
-              </p:cNvPr>
-              <p:cNvPicPr>
-                <a:picLocks noChangeAspect="1"/>
-              </p:cNvPicPr>
-              <p:nvPr/>
-            </p:nvPicPr>
-            <p:blipFill rotWithShape="1">
-              <a:blip r:embed="rId4"/>
-              <a:srcRect l="21763" t="6744" b="34757"/>
-              <a:stretch/>
-            </p:blipFill>
-            <p:spPr>
-              <a:xfrm>
-                <a:off x="3400789" y="4957370"/>
-                <a:ext cx="3387756" cy="2616008"/>
-              </a:xfrm>
-              <a:prstGeom prst="rect">
-                <a:avLst/>
-              </a:prstGeom>
-            </p:spPr>
-          </p:pic>
-        </p:grpSp>
-        <p:pic>
-          <p:nvPicPr>
-            <p:cNvPr id="14" name="Picture 13">
-              <a:extLst>
-                <a:ext uri="{FF2B5EF4-FFF2-40B4-BE49-F238E27FC236}">
-                  <a16:creationId xmlns:a16="http://schemas.microsoft.com/office/drawing/2014/main" id="{5E45EE8B-3781-2763-1928-59A60ED830C4}"/>
-                </a:ext>
-              </a:extLst>
-            </p:cNvPr>
-            <p:cNvPicPr>
-              <a:picLocks noChangeAspect="1"/>
-            </p:cNvPicPr>
-            <p:nvPr/>
-          </p:nvPicPr>
-          <p:blipFill rotWithShape="1">
-            <a:blip r:embed="rId4"/>
-            <a:srcRect l="307" t="528" r="81604" b="34757"/>
-            <a:stretch/>
-          </p:blipFill>
-          <p:spPr>
-            <a:xfrm>
-              <a:off x="2569164" y="4795832"/>
-              <a:ext cx="783636" cy="2895245"/>
-            </a:xfrm>
-            <a:prstGeom prst="rect">
-              <a:avLst/>
-            </a:prstGeom>
-          </p:spPr>
-        </p:pic>
-      </p:grpSp>
       <p:sp>
         <p:nvSpPr>
           <p:cNvPr id="4" name="TextBox 3">
@@ -3302,13 +3074,13 @@
           <p:nvPr/>
         </p:nvPicPr>
         <p:blipFill>
-          <a:blip r:embed="rId5">
+          <a:blip r:embed="rId2">
             <a:extLst>
               <a:ext uri="{28A0092B-C50C-407E-A947-70E740481C1C}">
                 <a14:useLocalDpi xmlns:a14="http://schemas.microsoft.com/office/drawing/2010/main" val="0"/>
               </a:ext>
               <a:ext uri="{96DAC541-7B7A-43D3-8B79-37D633B846F1}">
-                <asvg:svgBlip xmlns:asvg="http://schemas.microsoft.com/office/drawing/2016/SVG/main" r:embed="rId6"/>
+                <asvg:svgBlip xmlns:asvg="http://schemas.microsoft.com/office/drawing/2016/SVG/main" r:embed="rId3"/>
               </a:ext>
             </a:extLst>
           </a:blip>
@@ -3341,13 +3113,13 @@
           <p:nvPr/>
         </p:nvPicPr>
         <p:blipFill>
-          <a:blip r:embed="rId7">
+          <a:blip r:embed="rId4">
             <a:extLst>
               <a:ext uri="{28A0092B-C50C-407E-A947-70E740481C1C}">
                 <a14:useLocalDpi xmlns:a14="http://schemas.microsoft.com/office/drawing/2010/main" val="0"/>
               </a:ext>
               <a:ext uri="{96DAC541-7B7A-43D3-8B79-37D633B846F1}">
-                <asvg:svgBlip xmlns:asvg="http://schemas.microsoft.com/office/drawing/2016/SVG/main" r:embed="rId8"/>
+                <asvg:svgBlip xmlns:asvg="http://schemas.microsoft.com/office/drawing/2016/SVG/main" r:embed="rId5"/>
               </a:ext>
             </a:extLst>
           </a:blip>
@@ -3380,13 +3152,13 @@
           <p:nvPr/>
         </p:nvPicPr>
         <p:blipFill>
-          <a:blip r:embed="rId9">
+          <a:blip r:embed="rId6">
             <a:extLst>
               <a:ext uri="{28A0092B-C50C-407E-A947-70E740481C1C}">
                 <a14:useLocalDpi xmlns:a14="http://schemas.microsoft.com/office/drawing/2010/main" val="0"/>
               </a:ext>
               <a:ext uri="{96DAC541-7B7A-43D3-8B79-37D633B846F1}">
-                <asvg:svgBlip xmlns:asvg="http://schemas.microsoft.com/office/drawing/2016/SVG/main" r:embed="rId10"/>
+                <asvg:svgBlip xmlns:asvg="http://schemas.microsoft.com/office/drawing/2016/SVG/main" r:embed="rId7"/>
               </a:ext>
             </a:extLst>
           </a:blip>
@@ -3695,7 +3467,7 @@
           <p:nvPr/>
         </p:nvPicPr>
         <p:blipFill>
-          <a:blip r:embed="rId11">
+          <a:blip r:embed="rId8">
             <a:extLst>
               <a:ext uri="{28A0092B-C50C-407E-A947-70E740481C1C}">
                 <a14:useLocalDpi xmlns:a14="http://schemas.microsoft.com/office/drawing/2010/main" val="0"/>
@@ -4204,13 +3976,13 @@
           <p:nvPr/>
         </p:nvPicPr>
         <p:blipFill>
-          <a:blip r:embed="rId12">
+          <a:blip r:embed="rId9">
             <a:extLst>
               <a:ext uri="{28A0092B-C50C-407E-A947-70E740481C1C}">
                 <a14:useLocalDpi xmlns:a14="http://schemas.microsoft.com/office/drawing/2010/main" val="0"/>
               </a:ext>
               <a:ext uri="{96DAC541-7B7A-43D3-8B79-37D633B846F1}">
-                <asvg:svgBlip xmlns:asvg="http://schemas.microsoft.com/office/drawing/2016/SVG/main" r:embed="rId13"/>
+                <asvg:svgBlip xmlns:asvg="http://schemas.microsoft.com/office/drawing/2016/SVG/main" r:embed="rId10"/>
               </a:ext>
             </a:extLst>
           </a:blip>
@@ -4243,13 +4015,13 @@
           <p:nvPr/>
         </p:nvPicPr>
         <p:blipFill>
-          <a:blip r:embed="rId14">
+          <a:blip r:embed="rId11">
             <a:extLst>
               <a:ext uri="{28A0092B-C50C-407E-A947-70E740481C1C}">
                 <a14:useLocalDpi xmlns:a14="http://schemas.microsoft.com/office/drawing/2010/main" val="0"/>
               </a:ext>
               <a:ext uri="{96DAC541-7B7A-43D3-8B79-37D633B846F1}">
-                <asvg:svgBlip xmlns:asvg="http://schemas.microsoft.com/office/drawing/2016/SVG/main" r:embed="rId15"/>
+                <asvg:svgBlip xmlns:asvg="http://schemas.microsoft.com/office/drawing/2016/SVG/main" r:embed="rId12"/>
               </a:ext>
             </a:extLst>
           </a:blip>
@@ -4282,13 +4054,13 @@
           <p:nvPr/>
         </p:nvPicPr>
         <p:blipFill>
-          <a:blip r:embed="rId16">
+          <a:blip r:embed="rId13">
             <a:extLst>
               <a:ext uri="{28A0092B-C50C-407E-A947-70E740481C1C}">
                 <a14:useLocalDpi xmlns:a14="http://schemas.microsoft.com/office/drawing/2010/main" val="0"/>
               </a:ext>
               <a:ext uri="{96DAC541-7B7A-43D3-8B79-37D633B846F1}">
-                <asvg:svgBlip xmlns:asvg="http://schemas.microsoft.com/office/drawing/2016/SVG/main" r:embed="rId17"/>
+                <asvg:svgBlip xmlns:asvg="http://schemas.microsoft.com/office/drawing/2016/SVG/main" r:embed="rId14"/>
               </a:ext>
             </a:extLst>
           </a:blip>
@@ -4321,13 +4093,13 @@
           <p:nvPr/>
         </p:nvPicPr>
         <p:blipFill>
-          <a:blip r:embed="rId18">
+          <a:blip r:embed="rId15">
             <a:extLst>
               <a:ext uri="{28A0092B-C50C-407E-A947-70E740481C1C}">
                 <a14:useLocalDpi xmlns:a14="http://schemas.microsoft.com/office/drawing/2010/main" val="0"/>
               </a:ext>
               <a:ext uri="{96DAC541-7B7A-43D3-8B79-37D633B846F1}">
-                <asvg:svgBlip xmlns:asvg="http://schemas.microsoft.com/office/drawing/2016/SVG/main" r:embed="rId19"/>
+                <asvg:svgBlip xmlns:asvg="http://schemas.microsoft.com/office/drawing/2016/SVG/main" r:embed="rId16"/>
               </a:ext>
             </a:extLst>
           </a:blip>
@@ -7734,7 +7506,7 @@
           <p:nvPr/>
         </p:nvPicPr>
         <p:blipFill>
-          <a:blip r:embed="rId20">
+          <a:blip r:embed="rId17">
             <a:extLst>
               <a:ext uri="{28A0092B-C50C-407E-A947-70E740481C1C}">
                 <a14:useLocalDpi xmlns:a14="http://schemas.microsoft.com/office/drawing/2010/main" val="0"/>
@@ -8927,6 +8699,209 @@
           </a:p>
         </p:txBody>
       </p:sp>
+      <p:grpSp>
+        <p:nvGrpSpPr>
+          <p:cNvPr id="19" name="Group 18">
+            <a:extLst>
+              <a:ext uri="{FF2B5EF4-FFF2-40B4-BE49-F238E27FC236}">
+                <a16:creationId xmlns:a16="http://schemas.microsoft.com/office/drawing/2014/main" id="{61D4A007-9C2E-1DC8-2D8D-FBFAD22CCC44}"/>
+              </a:ext>
+            </a:extLst>
+          </p:cNvPr>
+          <p:cNvGrpSpPr/>
+          <p:nvPr/>
+        </p:nvGrpSpPr>
+        <p:grpSpPr>
+          <a:xfrm>
+            <a:off x="2427852" y="4926807"/>
+            <a:ext cx="4282308" cy="4488531"/>
+            <a:chOff x="2526277" y="4893469"/>
+            <a:chExt cx="4282308" cy="4488531"/>
+          </a:xfrm>
+        </p:grpSpPr>
+        <p:grpSp>
+          <p:nvGrpSpPr>
+            <p:cNvPr id="12" name="Group 11">
+              <a:extLst>
+                <a:ext uri="{FF2B5EF4-FFF2-40B4-BE49-F238E27FC236}">
+                  <a16:creationId xmlns:a16="http://schemas.microsoft.com/office/drawing/2014/main" id="{4969CE4F-5D4E-9F38-E568-5459BE2FAEC9}"/>
+                </a:ext>
+              </a:extLst>
+            </p:cNvPr>
+            <p:cNvGrpSpPr/>
+            <p:nvPr/>
+          </p:nvGrpSpPr>
+          <p:grpSpPr>
+            <a:xfrm>
+              <a:off x="2750508" y="4893469"/>
+              <a:ext cx="4058077" cy="4488531"/>
+              <a:chOff x="2760032" y="4933950"/>
+              <a:chExt cx="4058077" cy="4488531"/>
+            </a:xfrm>
+          </p:grpSpPr>
+          <p:pic>
+            <p:nvPicPr>
+              <p:cNvPr id="3" name="Picture 2" descr="A picture containing graphical user interface&#10;&#10;Description automatically generated">
+                <a:extLst>
+                  <a:ext uri="{FF2B5EF4-FFF2-40B4-BE49-F238E27FC236}">
+                    <a16:creationId xmlns:a16="http://schemas.microsoft.com/office/drawing/2014/main" id="{A7DC470E-E165-5972-74BC-81E0D477848C}"/>
+                  </a:ext>
+                </a:extLst>
+              </p:cNvPr>
+              <p:cNvPicPr>
+                <a:picLocks noChangeAspect="1"/>
+              </p:cNvPicPr>
+              <p:nvPr/>
+            </p:nvPicPr>
+            <p:blipFill rotWithShape="1">
+              <a:blip r:embed="rId18">
+                <a:extLst>
+                  <a:ext uri="{28A0092B-C50C-407E-A947-70E740481C1C}">
+                    <a14:useLocalDpi xmlns:a14="http://schemas.microsoft.com/office/drawing/2010/main" val="0"/>
+                  </a:ext>
+                </a:extLst>
+              </a:blip>
+              <a:srcRect l="8269" t="626"/>
+              <a:stretch/>
+            </p:blipFill>
+            <p:spPr>
+              <a:xfrm>
+                <a:off x="2787829" y="4933950"/>
+                <a:ext cx="4030280" cy="4488531"/>
+              </a:xfrm>
+              <a:prstGeom prst="rect">
+                <a:avLst/>
+              </a:prstGeom>
+            </p:spPr>
+          </p:pic>
+          <p:pic>
+            <p:nvPicPr>
+              <p:cNvPr id="8" name="Picture 7" descr="A picture containing table&#10;&#10;Description automatically generated">
+                <a:extLst>
+                  <a:ext uri="{FF2B5EF4-FFF2-40B4-BE49-F238E27FC236}">
+                    <a16:creationId xmlns:a16="http://schemas.microsoft.com/office/drawing/2014/main" id="{D12669D7-4AB9-EA90-BE01-127C2FAE29C4}"/>
+                  </a:ext>
+                </a:extLst>
+              </p:cNvPr>
+              <p:cNvPicPr>
+                <a:picLocks noChangeAspect="1"/>
+              </p:cNvPicPr>
+              <p:nvPr/>
+            </p:nvPicPr>
+            <p:blipFill rotWithShape="1">
+              <a:blip r:embed="rId19">
+                <a:extLst>
+                  <a:ext uri="{28A0092B-C50C-407E-A947-70E740481C1C}">
+                    <a14:useLocalDpi xmlns:a14="http://schemas.microsoft.com/office/drawing/2010/main" val="0"/>
+                  </a:ext>
+                </a:extLst>
+              </a:blip>
+              <a:srcRect l="7905" t="61496"/>
+              <a:stretch/>
+            </p:blipFill>
+            <p:spPr>
+              <a:xfrm>
+                <a:off x="2760032" y="7658102"/>
+                <a:ext cx="4030280" cy="1723349"/>
+              </a:xfrm>
+              <a:prstGeom prst="rect">
+                <a:avLst/>
+              </a:prstGeom>
+            </p:spPr>
+          </p:pic>
+        </p:grpSp>
+        <p:grpSp>
+          <p:nvGrpSpPr>
+            <p:cNvPr id="16" name="Group 15">
+              <a:extLst>
+                <a:ext uri="{FF2B5EF4-FFF2-40B4-BE49-F238E27FC236}">
+                  <a16:creationId xmlns:a16="http://schemas.microsoft.com/office/drawing/2014/main" id="{15043FC2-1AD5-BB45-75DD-2D27FDB939BA}"/>
+                </a:ext>
+              </a:extLst>
+            </p:cNvPr>
+            <p:cNvGrpSpPr/>
+            <p:nvPr/>
+          </p:nvGrpSpPr>
+          <p:grpSpPr>
+            <a:xfrm>
+              <a:off x="2526277" y="4893469"/>
+              <a:ext cx="813823" cy="4447501"/>
+              <a:chOff x="2414114" y="4933950"/>
+              <a:chExt cx="813823" cy="4447501"/>
+            </a:xfrm>
+          </p:grpSpPr>
+          <p:pic>
+            <p:nvPicPr>
+              <p:cNvPr id="17" name="Picture 16" descr="A picture containing graphical user interface&#10;&#10;Description automatically generated">
+                <a:extLst>
+                  <a:ext uri="{FF2B5EF4-FFF2-40B4-BE49-F238E27FC236}">
+                    <a16:creationId xmlns:a16="http://schemas.microsoft.com/office/drawing/2014/main" id="{4DDFFB29-826D-E3C0-A7C8-B9814F1B8F79}"/>
+                  </a:ext>
+                </a:extLst>
+              </p:cNvPr>
+              <p:cNvPicPr>
+                <a:picLocks noChangeAspect="1"/>
+              </p:cNvPicPr>
+              <p:nvPr/>
+            </p:nvPicPr>
+            <p:blipFill rotWithShape="1">
+              <a:blip r:embed="rId18">
+                <a:extLst>
+                  <a:ext uri="{28A0092B-C50C-407E-A947-70E740481C1C}">
+                    <a14:useLocalDpi xmlns:a14="http://schemas.microsoft.com/office/drawing/2010/main" val="0"/>
+                  </a:ext>
+                </a:extLst>
+              </a:blip>
+              <a:srcRect t="626" r="81714" b="40051"/>
+              <a:stretch/>
+            </p:blipFill>
+            <p:spPr>
+              <a:xfrm>
+                <a:off x="2424541" y="4933950"/>
+                <a:ext cx="803396" cy="2679509"/>
+              </a:xfrm>
+              <a:prstGeom prst="rect">
+                <a:avLst/>
+              </a:prstGeom>
+            </p:spPr>
+          </p:pic>
+          <p:pic>
+            <p:nvPicPr>
+              <p:cNvPr id="18" name="Picture 17" descr="A picture containing table&#10;&#10;Description automatically generated">
+                <a:extLst>
+                  <a:ext uri="{FF2B5EF4-FFF2-40B4-BE49-F238E27FC236}">
+                    <a16:creationId xmlns:a16="http://schemas.microsoft.com/office/drawing/2014/main" id="{A80847B3-41FF-DD2D-16E2-505E6124DF4D}"/>
+                  </a:ext>
+                </a:extLst>
+              </p:cNvPr>
+              <p:cNvPicPr>
+                <a:picLocks noChangeAspect="1"/>
+              </p:cNvPicPr>
+              <p:nvPr/>
+            </p:nvPicPr>
+            <p:blipFill rotWithShape="1">
+              <a:blip r:embed="rId19">
+                <a:extLst>
+                  <a:ext uri="{28A0092B-C50C-407E-A947-70E740481C1C}">
+                    <a14:useLocalDpi xmlns:a14="http://schemas.microsoft.com/office/drawing/2010/main" val="0"/>
+                  </a:ext>
+                </a:extLst>
+              </a:blip>
+              <a:srcRect t="61496" r="84305"/>
+              <a:stretch/>
+            </p:blipFill>
+            <p:spPr>
+              <a:xfrm>
+                <a:off x="2414114" y="7658102"/>
+                <a:ext cx="686824" cy="1723349"/>
+              </a:xfrm>
+              <a:prstGeom prst="rect">
+                <a:avLst/>
+              </a:prstGeom>
+            </p:spPr>
+          </p:pic>
+        </p:grpSp>
+      </p:grpSp>
     </p:spTree>
     <p:extLst>
       <p:ext uri="{BB962C8B-B14F-4D97-AF65-F5344CB8AC3E}">

</xml_diff>

<commit_message>
Updated following another feedback session with Adelina
</commit_message>
<xml_diff>
--- a/src/CV_AlexYates_EMEA.pptx
+++ b/src/CV_AlexYates_EMEA.pptx
@@ -9,7 +9,7 @@
     <p:sldId id="257" r:id="rId3"/>
   </p:sldIdLst>
   <p:sldSz cx="6858000" cy="9906000" type="A4"/>
-  <p:notesSz cx="6858000" cy="9144000"/>
+  <p:notesSz cx="6888163" cy="10020300"/>
   <p:defaultTextStyle>
     <a:defPPr>
       <a:defRPr lang="en-US"/>
@@ -242,7 +242,7 @@
           <a:p>
             <a:fld id="{335876D0-9B75-44B5-9404-8FDAD3FB5281}" type="datetimeFigureOut">
               <a:rPr lang="en-GB" smtClean="0"/>
-              <a:t>10/11/2022</a:t>
+              <a:t>11/11/2022</a:t>
             </a:fld>
             <a:endParaRPr lang="en-GB"/>
           </a:p>
@@ -412,7 +412,7 @@
           <a:p>
             <a:fld id="{335876D0-9B75-44B5-9404-8FDAD3FB5281}" type="datetimeFigureOut">
               <a:rPr lang="en-GB" smtClean="0"/>
-              <a:t>10/11/2022</a:t>
+              <a:t>11/11/2022</a:t>
             </a:fld>
             <a:endParaRPr lang="en-GB"/>
           </a:p>
@@ -592,7 +592,7 @@
           <a:p>
             <a:fld id="{335876D0-9B75-44B5-9404-8FDAD3FB5281}" type="datetimeFigureOut">
               <a:rPr lang="en-GB" smtClean="0"/>
-              <a:t>10/11/2022</a:t>
+              <a:t>11/11/2022</a:t>
             </a:fld>
             <a:endParaRPr lang="en-GB"/>
           </a:p>
@@ -768,7 +768,7 @@
           <a:p>
             <a:fld id="{335876D0-9B75-44B5-9404-8FDAD3FB5281}" type="datetimeFigureOut">
               <a:rPr lang="en-GB" smtClean="0"/>
-              <a:t>10/11/2022</a:t>
+              <a:t>11/11/2022</a:t>
             </a:fld>
             <a:endParaRPr lang="en-GB"/>
           </a:p>
@@ -1012,7 +1012,7 @@
           <a:p>
             <a:fld id="{335876D0-9B75-44B5-9404-8FDAD3FB5281}" type="datetimeFigureOut">
               <a:rPr lang="en-GB" smtClean="0"/>
-              <a:t>10/11/2022</a:t>
+              <a:t>11/11/2022</a:t>
             </a:fld>
             <a:endParaRPr lang="en-GB"/>
           </a:p>
@@ -1244,7 +1244,7 @@
           <a:p>
             <a:fld id="{335876D0-9B75-44B5-9404-8FDAD3FB5281}" type="datetimeFigureOut">
               <a:rPr lang="en-GB" smtClean="0"/>
-              <a:t>10/11/2022</a:t>
+              <a:t>11/11/2022</a:t>
             </a:fld>
             <a:endParaRPr lang="en-GB"/>
           </a:p>
@@ -1611,7 +1611,7 @@
           <a:p>
             <a:fld id="{335876D0-9B75-44B5-9404-8FDAD3FB5281}" type="datetimeFigureOut">
               <a:rPr lang="en-GB" smtClean="0"/>
-              <a:t>10/11/2022</a:t>
+              <a:t>11/11/2022</a:t>
             </a:fld>
             <a:endParaRPr lang="en-GB"/>
           </a:p>
@@ -1729,7 +1729,7 @@
           <a:p>
             <a:fld id="{335876D0-9B75-44B5-9404-8FDAD3FB5281}" type="datetimeFigureOut">
               <a:rPr lang="en-GB" smtClean="0"/>
-              <a:t>10/11/2022</a:t>
+              <a:t>11/11/2022</a:t>
             </a:fld>
             <a:endParaRPr lang="en-GB"/>
           </a:p>
@@ -1824,7 +1824,7 @@
           <a:p>
             <a:fld id="{335876D0-9B75-44B5-9404-8FDAD3FB5281}" type="datetimeFigureOut">
               <a:rPr lang="en-GB" smtClean="0"/>
-              <a:t>10/11/2022</a:t>
+              <a:t>11/11/2022</a:t>
             </a:fld>
             <a:endParaRPr lang="en-GB"/>
           </a:p>
@@ -2101,7 +2101,7 @@
           <a:p>
             <a:fld id="{335876D0-9B75-44B5-9404-8FDAD3FB5281}" type="datetimeFigureOut">
               <a:rPr lang="en-GB" smtClean="0"/>
-              <a:t>10/11/2022</a:t>
+              <a:t>11/11/2022</a:t>
             </a:fld>
             <a:endParaRPr lang="en-GB"/>
           </a:p>
@@ -2358,7 +2358,7 @@
           <a:p>
             <a:fld id="{335876D0-9B75-44B5-9404-8FDAD3FB5281}" type="datetimeFigureOut">
               <a:rPr lang="en-GB" smtClean="0"/>
-              <a:t>10/11/2022</a:t>
+              <a:t>11/11/2022</a:t>
             </a:fld>
             <a:endParaRPr lang="en-GB"/>
           </a:p>
@@ -2571,7 +2571,7 @@
           <a:p>
             <a:fld id="{335876D0-9B75-44B5-9404-8FDAD3FB5281}" type="datetimeFigureOut">
               <a:rPr lang="en-GB" smtClean="0"/>
-              <a:t>10/11/2022</a:t>
+              <a:t>11/11/2022</a:t>
             </a:fld>
             <a:endParaRPr lang="en-GB"/>
           </a:p>
@@ -3402,12 +3402,20 @@
           </a:p>
           <a:p>
             <a:r>
+              <a:rPr lang="en-GB" sz="1100" dirty="0">
+                <a:solidFill>
+                  <a:srgbClr val="262F3B"/>
+                </a:solidFill>
+              </a:rPr>
+              <a:t>Now seeks to develop tech skills/experience with major languages (</a:t>
+            </a:r>
+            <a:r>
               <a:rPr lang="en-GB" sz="1100" b="1" dirty="0">
                 <a:solidFill>
                   <a:srgbClr val="262F3B"/>
                 </a:solidFill>
               </a:rPr>
-              <a:t>Passionate learner, </a:t>
+              <a:t>C#/Java </a:t>
             </a:r>
             <a:r>
               <a:rPr lang="en-GB" sz="1100" dirty="0">
@@ -3415,7 +3423,7 @@
                   <a:srgbClr val="262F3B"/>
                 </a:solidFill>
               </a:rPr>
-              <a:t>who works best in </a:t>
+              <a:t>etc) and platforms (</a:t>
             </a:r>
             <a:r>
               <a:rPr lang="en-GB" sz="1100" b="1" dirty="0">
@@ -3423,7 +3431,7 @@
                   <a:srgbClr val="262F3B"/>
                 </a:solidFill>
               </a:rPr>
-              <a:t>cross-functional</a:t>
+              <a:t>Azure/AWS</a:t>
             </a:r>
             <a:r>
               <a:rPr lang="en-GB" sz="1100" dirty="0">
@@ -3431,23 +3439,7 @@
                   <a:srgbClr val="262F3B"/>
                 </a:solidFill>
               </a:rPr>
-              <a:t> </a:t>
-            </a:r>
-            <a:r>
-              <a:rPr lang="en-GB" sz="1100" b="1" dirty="0">
-                <a:solidFill>
-                  <a:srgbClr val="262F3B"/>
-                </a:solidFill>
-              </a:rPr>
-              <a:t>teams</a:t>
-            </a:r>
-            <a:r>
-              <a:rPr lang="en-GB" sz="1100" dirty="0">
-                <a:solidFill>
-                  <a:srgbClr val="262F3B"/>
-                </a:solidFill>
-              </a:rPr>
-              <a:t> where ideas are more easily shared, optimised, and implemented.</a:t>
+              <a:t>), within a stream-aligned or platform team.</a:t>
             </a:r>
           </a:p>
         </p:txBody>
@@ -8244,7 +8236,7 @@
         </p:nvSpPr>
         <p:spPr>
           <a:xfrm>
-            <a:off x="2439507" y="2060917"/>
+            <a:off x="2439507" y="2043985"/>
             <a:ext cx="4418493" cy="2908489"/>
           </a:xfrm>
           <a:prstGeom prst="rect">
@@ -8410,7 +8402,7 @@
                   <a:srgbClr val="262F3B"/>
                 </a:solidFill>
               </a:rPr>
-              <a:t>Promoted to director for showing success, responsibility, and leadership.</a:t>
+              <a:t>Promoted to director for success, responsibility, and leadership.</a:t>
             </a:r>
             <a:endParaRPr lang="en-GB" sz="1100" dirty="0">
               <a:solidFill>
@@ -8482,7 +8474,7 @@
                   <a:srgbClr val="262F3B"/>
                 </a:solidFill>
               </a:rPr>
-              <a:t>Flourished in x-functional collaboration and tech sales/implementation.</a:t>
+              <a:t>Flourished in x-functional innovation and tech sales/implementation.</a:t>
             </a:r>
           </a:p>
           <a:p>
@@ -8510,7 +8502,7 @@
                   <a:srgbClr val="262F3B"/>
                 </a:solidFill>
               </a:rPr>
-              <a:t>Promoted to Solutions Engineer. Worked with dev team on new products.</a:t>
+              <a:t>Promoted to Solutions Engineer. Worked w/ dev team on new products.</a:t>
             </a:r>
           </a:p>
           <a:p>
@@ -8579,8 +8571,8 @@
         </p:nvCxnSpPr>
         <p:spPr>
           <a:xfrm>
-            <a:off x="2527652" y="4539360"/>
-            <a:ext cx="3993345" cy="0"/>
+            <a:off x="2510720" y="4533716"/>
+            <a:ext cx="4010277" cy="0"/>
           </a:xfrm>
           <a:prstGeom prst="line">
             <a:avLst/>
@@ -8902,6 +8894,67 @@
           </p:pic>
         </p:grpSp>
       </p:grpSp>
+      <p:sp>
+        <p:nvSpPr>
+          <p:cNvPr id="9" name="Rectangle 8">
+            <a:extLst>
+              <a:ext uri="{FF2B5EF4-FFF2-40B4-BE49-F238E27FC236}">
+                <a16:creationId xmlns:a16="http://schemas.microsoft.com/office/drawing/2014/main" id="{C9971CB9-AEB9-B118-FFBF-F0BEA965CBEE}"/>
+              </a:ext>
+            </a:extLst>
+          </p:cNvPr>
+          <p:cNvSpPr/>
+          <p:nvPr/>
+        </p:nvSpPr>
+        <p:spPr>
+          <a:xfrm>
+            <a:off x="0" y="5541209"/>
+            <a:ext cx="2401528" cy="1130522"/>
+          </a:xfrm>
+          <a:prstGeom prst="rect">
+            <a:avLst/>
+          </a:prstGeom>
+          <a:solidFill>
+            <a:srgbClr val="FFFF00">
+              <a:alpha val="50196"/>
+            </a:srgbClr>
+          </a:solidFill>
+          <a:ln>
+            <a:noFill/>
+          </a:ln>
+        </p:spPr>
+        <p:style>
+          <a:lnRef idx="2">
+            <a:schemeClr val="accent1">
+              <a:shade val="50000"/>
+            </a:schemeClr>
+          </a:lnRef>
+          <a:fillRef idx="1">
+            <a:schemeClr val="accent1"/>
+          </a:fillRef>
+          <a:effectRef idx="0">
+            <a:schemeClr val="accent1"/>
+          </a:effectRef>
+          <a:fontRef idx="minor">
+            <a:schemeClr val="lt1"/>
+          </a:fontRef>
+        </p:style>
+        <p:txBody>
+          <a:bodyPr vert="vert270" rtlCol="0" anchor="t"/>
+          <a:lstStyle/>
+          <a:p>
+            <a:pPr algn="ctr"/>
+            <a:r>
+              <a:rPr lang="en-GB" sz="900" dirty="0">
+                <a:solidFill>
+                  <a:schemeClr val="tx1"/>
+                </a:solidFill>
+              </a:rPr>
+              <a:t>Priority growth area</a:t>
+            </a:r>
+          </a:p>
+        </p:txBody>
+      </p:sp>
     </p:spTree>
     <p:extLst>
       <p:ext uri="{BB962C8B-B14F-4D97-AF65-F5344CB8AC3E}">

</xml_diff>

<commit_message>
Tech wriging and B2B sales
</commit_message>
<xml_diff>
--- a/src/CV_AlexYates_EMEA.pptx
+++ b/src/CV_AlexYates_EMEA.pptx
@@ -3709,13 +3709,13 @@
           <a:p>
             <a:r>
               <a:rPr lang="en-GB" sz="1100" dirty="0"/>
-              <a:t>Writing</a:t>
+              <a:t>Blog/tech writing</a:t>
             </a:r>
           </a:p>
           <a:p>
             <a:r>
               <a:rPr lang="en-GB" sz="1100" dirty="0"/>
-              <a:t>Sales</a:t>
+              <a:t>B2B sales</a:t>
             </a:r>
           </a:p>
           <a:p>

</xml_diff>

<commit_message>
Updated following feedback from Ben
</commit_message>
<xml_diff>
--- a/src/CV_AlexYates_EMEA.pptx
+++ b/src/CV_AlexYates_EMEA.pptx
@@ -242,7 +242,7 @@
           <a:p>
             <a:fld id="{335876D0-9B75-44B5-9404-8FDAD3FB5281}" type="datetimeFigureOut">
               <a:rPr lang="en-GB" smtClean="0"/>
-              <a:t>11/11/2022</a:t>
+              <a:t>20/12/2022</a:t>
             </a:fld>
             <a:endParaRPr lang="en-GB"/>
           </a:p>
@@ -412,7 +412,7 @@
           <a:p>
             <a:fld id="{335876D0-9B75-44B5-9404-8FDAD3FB5281}" type="datetimeFigureOut">
               <a:rPr lang="en-GB" smtClean="0"/>
-              <a:t>11/11/2022</a:t>
+              <a:t>20/12/2022</a:t>
             </a:fld>
             <a:endParaRPr lang="en-GB"/>
           </a:p>
@@ -592,7 +592,7 @@
           <a:p>
             <a:fld id="{335876D0-9B75-44B5-9404-8FDAD3FB5281}" type="datetimeFigureOut">
               <a:rPr lang="en-GB" smtClean="0"/>
-              <a:t>11/11/2022</a:t>
+              <a:t>20/12/2022</a:t>
             </a:fld>
             <a:endParaRPr lang="en-GB"/>
           </a:p>
@@ -768,7 +768,7 @@
           <a:p>
             <a:fld id="{335876D0-9B75-44B5-9404-8FDAD3FB5281}" type="datetimeFigureOut">
               <a:rPr lang="en-GB" smtClean="0"/>
-              <a:t>11/11/2022</a:t>
+              <a:t>20/12/2022</a:t>
             </a:fld>
             <a:endParaRPr lang="en-GB"/>
           </a:p>
@@ -1012,7 +1012,7 @@
           <a:p>
             <a:fld id="{335876D0-9B75-44B5-9404-8FDAD3FB5281}" type="datetimeFigureOut">
               <a:rPr lang="en-GB" smtClean="0"/>
-              <a:t>11/11/2022</a:t>
+              <a:t>20/12/2022</a:t>
             </a:fld>
             <a:endParaRPr lang="en-GB"/>
           </a:p>
@@ -1244,7 +1244,7 @@
           <a:p>
             <a:fld id="{335876D0-9B75-44B5-9404-8FDAD3FB5281}" type="datetimeFigureOut">
               <a:rPr lang="en-GB" smtClean="0"/>
-              <a:t>11/11/2022</a:t>
+              <a:t>20/12/2022</a:t>
             </a:fld>
             <a:endParaRPr lang="en-GB"/>
           </a:p>
@@ -1611,7 +1611,7 @@
           <a:p>
             <a:fld id="{335876D0-9B75-44B5-9404-8FDAD3FB5281}" type="datetimeFigureOut">
               <a:rPr lang="en-GB" smtClean="0"/>
-              <a:t>11/11/2022</a:t>
+              <a:t>20/12/2022</a:t>
             </a:fld>
             <a:endParaRPr lang="en-GB"/>
           </a:p>
@@ -1729,7 +1729,7 @@
           <a:p>
             <a:fld id="{335876D0-9B75-44B5-9404-8FDAD3FB5281}" type="datetimeFigureOut">
               <a:rPr lang="en-GB" smtClean="0"/>
-              <a:t>11/11/2022</a:t>
+              <a:t>20/12/2022</a:t>
             </a:fld>
             <a:endParaRPr lang="en-GB"/>
           </a:p>
@@ -1824,7 +1824,7 @@
           <a:p>
             <a:fld id="{335876D0-9B75-44B5-9404-8FDAD3FB5281}" type="datetimeFigureOut">
               <a:rPr lang="en-GB" smtClean="0"/>
-              <a:t>11/11/2022</a:t>
+              <a:t>20/12/2022</a:t>
             </a:fld>
             <a:endParaRPr lang="en-GB"/>
           </a:p>
@@ -2101,7 +2101,7 @@
           <a:p>
             <a:fld id="{335876D0-9B75-44B5-9404-8FDAD3FB5281}" type="datetimeFigureOut">
               <a:rPr lang="en-GB" smtClean="0"/>
-              <a:t>11/11/2022</a:t>
+              <a:t>20/12/2022</a:t>
             </a:fld>
             <a:endParaRPr lang="en-GB"/>
           </a:p>
@@ -2358,7 +2358,7 @@
           <a:p>
             <a:fld id="{335876D0-9B75-44B5-9404-8FDAD3FB5281}" type="datetimeFigureOut">
               <a:rPr lang="en-GB" smtClean="0"/>
-              <a:t>11/11/2022</a:t>
+              <a:t>20/12/2022</a:t>
             </a:fld>
             <a:endParaRPr lang="en-GB"/>
           </a:p>
@@ -2571,7 +2571,7 @@
           <a:p>
             <a:fld id="{335876D0-9B75-44B5-9404-8FDAD3FB5281}" type="datetimeFigureOut">
               <a:rPr lang="en-GB" smtClean="0"/>
-              <a:t>11/11/2022</a:t>
+              <a:t>20/12/2022</a:t>
             </a:fld>
             <a:endParaRPr lang="en-GB"/>
           </a:p>
@@ -3176,274 +3176,6 @@
           </a:prstGeom>
         </p:spPr>
       </p:pic>
-      <p:sp>
-        <p:nvSpPr>
-          <p:cNvPr id="21" name="TextBox 20">
-            <a:extLst>
-              <a:ext uri="{FF2B5EF4-FFF2-40B4-BE49-F238E27FC236}">
-                <a16:creationId xmlns:a16="http://schemas.microsoft.com/office/drawing/2014/main" id="{660FC469-D767-94A8-E312-FA358931A5BA}"/>
-              </a:ext>
-            </a:extLst>
-          </p:cNvPr>
-          <p:cNvSpPr txBox="1"/>
-          <p:nvPr/>
-        </p:nvSpPr>
-        <p:spPr>
-          <a:xfrm>
-            <a:off x="182880" y="723076"/>
-            <a:ext cx="4686792" cy="1231106"/>
-          </a:xfrm>
-          <a:prstGeom prst="rect">
-            <a:avLst/>
-          </a:prstGeom>
-          <a:noFill/>
-        </p:spPr>
-        <p:txBody>
-          <a:bodyPr wrap="square" rtlCol="0">
-            <a:spAutoFit/>
-          </a:bodyPr>
-          <a:lstStyle/>
-          <a:p>
-            <a:r>
-              <a:rPr lang="en-GB" sz="1100" b="1" dirty="0">
-                <a:solidFill>
-                  <a:srgbClr val="262F3B"/>
-                </a:solidFill>
-              </a:rPr>
-              <a:t>12 years of DevOps experience</a:t>
-            </a:r>
-            <a:r>
-              <a:rPr lang="en-GB" sz="1100" dirty="0">
-                <a:solidFill>
-                  <a:srgbClr val="262F3B"/>
-                </a:solidFill>
-              </a:rPr>
-              <a:t>. Helps folks to iterate tooling, process, and culture, to improve </a:t>
-            </a:r>
-            <a:r>
-              <a:rPr lang="en-GB" sz="1100" b="1" dirty="0">
-                <a:solidFill>
-                  <a:srgbClr val="262F3B"/>
-                </a:solidFill>
-              </a:rPr>
-              <a:t>DORA metrics </a:t>
-            </a:r>
-            <a:r>
-              <a:rPr lang="en-GB" sz="1100" dirty="0">
-                <a:solidFill>
-                  <a:srgbClr val="262F3B"/>
-                </a:solidFill>
-              </a:rPr>
-              <a:t>and deliver </a:t>
-            </a:r>
-            <a:r>
-              <a:rPr lang="en-GB" sz="1100" b="1" dirty="0">
-                <a:solidFill>
-                  <a:srgbClr val="262F3B"/>
-                </a:solidFill>
-              </a:rPr>
-              <a:t>better business outcomes</a:t>
-            </a:r>
-            <a:r>
-              <a:rPr lang="en-GB" sz="1100" dirty="0">
-                <a:solidFill>
-                  <a:srgbClr val="262F3B"/>
-                </a:solidFill>
-              </a:rPr>
-              <a:t>.</a:t>
-            </a:r>
-            <a:br>
-              <a:rPr lang="en-GB" sz="1100" dirty="0">
-                <a:solidFill>
-                  <a:srgbClr val="262F3B"/>
-                </a:solidFill>
-              </a:rPr>
-            </a:br>
-            <a:r>
-              <a:rPr lang="en-GB" sz="400" dirty="0">
-                <a:solidFill>
-                  <a:srgbClr val="262F3B"/>
-                </a:solidFill>
-              </a:rPr>
-              <a:t> </a:t>
-            </a:r>
-          </a:p>
-          <a:p>
-            <a:r>
-              <a:rPr lang="en-GB" sz="1100" dirty="0">
-                <a:solidFill>
-                  <a:srgbClr val="262F3B"/>
-                </a:solidFill>
-              </a:rPr>
-              <a:t>Broad experience across</a:t>
-            </a:r>
-            <a:r>
-              <a:rPr lang="en-GB" sz="1100" b="1" dirty="0">
-                <a:solidFill>
-                  <a:srgbClr val="262F3B"/>
-                </a:solidFill>
-              </a:rPr>
-              <a:t> DevOps engineering</a:t>
-            </a:r>
-            <a:r>
-              <a:rPr lang="en-GB" sz="1100" dirty="0">
-                <a:solidFill>
-                  <a:srgbClr val="262F3B"/>
-                </a:solidFill>
-              </a:rPr>
-              <a:t>, </a:t>
-            </a:r>
-            <a:r>
-              <a:rPr lang="en-GB" sz="1100" b="1" dirty="0">
-                <a:solidFill>
-                  <a:srgbClr val="262F3B"/>
-                </a:solidFill>
-              </a:rPr>
-              <a:t>consulting</a:t>
-            </a:r>
-            <a:r>
-              <a:rPr lang="en-GB" sz="1100" dirty="0">
-                <a:solidFill>
-                  <a:srgbClr val="262F3B"/>
-                </a:solidFill>
-              </a:rPr>
-              <a:t>,</a:t>
-            </a:r>
-            <a:r>
-              <a:rPr lang="en-GB" sz="1100" b="1" dirty="0">
-                <a:solidFill>
-                  <a:srgbClr val="262F3B"/>
-                </a:solidFill>
-              </a:rPr>
-              <a:t> training</a:t>
-            </a:r>
-            <a:r>
-              <a:rPr lang="en-GB" sz="1100" dirty="0">
-                <a:solidFill>
-                  <a:srgbClr val="262F3B"/>
-                </a:solidFill>
-              </a:rPr>
-              <a:t>, </a:t>
-            </a:r>
-            <a:r>
-              <a:rPr lang="en-GB" sz="1100" b="1" dirty="0">
-                <a:solidFill>
-                  <a:srgbClr val="262F3B"/>
-                </a:solidFill>
-              </a:rPr>
-              <a:t>coaching</a:t>
-            </a:r>
-            <a:r>
-              <a:rPr lang="en-GB" sz="1100" dirty="0">
-                <a:solidFill>
-                  <a:srgbClr val="262F3B"/>
-                </a:solidFill>
-              </a:rPr>
-              <a:t>,</a:t>
-            </a:r>
-            <a:r>
-              <a:rPr lang="en-GB" sz="1100" b="1" dirty="0">
-                <a:solidFill>
-                  <a:srgbClr val="262F3B"/>
-                </a:solidFill>
-              </a:rPr>
-              <a:t> sales/solutions engineering</a:t>
-            </a:r>
-            <a:r>
-              <a:rPr lang="en-GB" sz="1100" dirty="0">
-                <a:solidFill>
-                  <a:srgbClr val="262F3B"/>
-                </a:solidFill>
-              </a:rPr>
-              <a:t>, </a:t>
-            </a:r>
-            <a:r>
-              <a:rPr lang="en-GB" sz="1100" b="1" dirty="0">
-                <a:solidFill>
-                  <a:srgbClr val="262F3B"/>
-                </a:solidFill>
-              </a:rPr>
-              <a:t>public speaking</a:t>
-            </a:r>
-            <a:r>
-              <a:rPr lang="en-GB" sz="1100" dirty="0">
-                <a:solidFill>
-                  <a:srgbClr val="262F3B"/>
-                </a:solidFill>
-              </a:rPr>
-              <a:t>, and </a:t>
-            </a:r>
-            <a:r>
-              <a:rPr lang="en-GB" sz="1100" b="1" dirty="0">
-                <a:solidFill>
-                  <a:srgbClr val="262F3B"/>
-                </a:solidFill>
-              </a:rPr>
-              <a:t>directing companies</a:t>
-            </a:r>
-            <a:r>
-              <a:rPr lang="en-GB" sz="1100" dirty="0">
-                <a:solidFill>
-                  <a:srgbClr val="262F3B"/>
-                </a:solidFill>
-              </a:rPr>
-              <a:t>.</a:t>
-            </a:r>
-          </a:p>
-          <a:p>
-            <a:r>
-              <a:rPr lang="en-GB" sz="400" dirty="0">
-                <a:solidFill>
-                  <a:srgbClr val="262F3B"/>
-                </a:solidFill>
-              </a:rPr>
-              <a:t> </a:t>
-            </a:r>
-          </a:p>
-          <a:p>
-            <a:r>
-              <a:rPr lang="en-GB" sz="1100" dirty="0">
-                <a:solidFill>
-                  <a:srgbClr val="262F3B"/>
-                </a:solidFill>
-              </a:rPr>
-              <a:t>Now seeks to develop tech skills/experience with major languages (</a:t>
-            </a:r>
-            <a:r>
-              <a:rPr lang="en-GB" sz="1100" b="1" dirty="0">
-                <a:solidFill>
-                  <a:srgbClr val="262F3B"/>
-                </a:solidFill>
-              </a:rPr>
-              <a:t>C#/Java </a:t>
-            </a:r>
-            <a:r>
-              <a:rPr lang="en-GB" sz="1100" dirty="0">
-                <a:solidFill>
-                  <a:srgbClr val="262F3B"/>
-                </a:solidFill>
-              </a:rPr>
-              <a:t>etc) and platforms (</a:t>
-            </a:r>
-            <a:r>
-              <a:rPr lang="en-GB" sz="1100" b="1" dirty="0">
-                <a:solidFill>
-                  <a:srgbClr val="262F3B"/>
-                </a:solidFill>
-              </a:rPr>
-              <a:t>Azure/AWS</a:t>
-            </a:r>
-            <a:r>
-              <a:rPr lang="en-GB" sz="1100" dirty="0">
-                <a:solidFill>
-                  <a:srgbClr val="262F3B"/>
-                </a:solidFill>
-              </a:rPr>
-              <a:t>), within a stream-aligned or platform team.</a:t>
-            </a:r>
-          </a:p>
-        </p:txBody>
-      </p:sp>
       <p:pic>
         <p:nvPicPr>
           <p:cNvPr id="23" name="Picture 22" descr="A picture containing clipart&#10;&#10;Description automatically generated">
@@ -3725,32 +3457,42 @@
               </a:spcBef>
             </a:pPr>
             <a:r>
+              <a:rPr lang="en-GB" sz="1100" dirty="0" err="1"/>
+              <a:t>Redgate,Flyway,SSDT</a:t>
+            </a:r>
+            <a:r>
               <a:rPr lang="en-GB" sz="1100" dirty="0"/>
-              <a:t>SDLC and CI/CD tools</a:t>
-            </a:r>
-          </a:p>
-          <a:p>
-            <a:r>
+              <a:t> </a:t>
+            </a:r>
+            <a:br>
               <a:rPr lang="en-GB" sz="1100" dirty="0"/>
-              <a:t>Database delivery</a:t>
-            </a:r>
-          </a:p>
-          <a:p>
+            </a:br>
             <a:r>
               <a:rPr lang="en-GB" sz="1100" dirty="0"/>
-              <a:t>T-SQL, PowerShell</a:t>
+              <a:t>ADO, Octopus Deploy</a:t>
             </a:r>
           </a:p>
           <a:p>
             <a:r>
               <a:rPr lang="en-GB" sz="1100" dirty="0"/>
-              <a:t>C#, Git</a:t>
+              <a:t>TeamCity, Jenkins</a:t>
             </a:r>
           </a:p>
           <a:p>
             <a:r>
               <a:rPr lang="en-GB" sz="1100" dirty="0"/>
-              <a:t>AWS, Azure</a:t>
+              <a:t>Git, C#, T-SQL, </a:t>
+            </a:r>
+            <a:r>
+              <a:rPr lang="en-GB" sz="1100" dirty="0" err="1"/>
+              <a:t>PoSh</a:t>
+            </a:r>
+            <a:endParaRPr lang="en-GB" sz="1100" dirty="0"/>
+          </a:p>
+          <a:p>
+            <a:r>
+              <a:rPr lang="en-GB" sz="1100" dirty="0"/>
+              <a:t>AWS (EC2/Lambda)</a:t>
             </a:r>
           </a:p>
           <a:p>
@@ -8237,7 +7979,7 @@
         <p:spPr>
           <a:xfrm>
             <a:off x="2439507" y="2043985"/>
-            <a:ext cx="4418493" cy="2908489"/>
+            <a:ext cx="4418493" cy="2993127"/>
           </a:xfrm>
           <a:prstGeom prst="rect">
             <a:avLst/>
@@ -8300,6 +8042,36 @@
                   <a:srgbClr val="262F3B"/>
                 </a:solidFill>
               </a:rPr>
+              <a:t>T-SQL CI/CD,  Test Data </a:t>
+            </a:r>
+            <a:r>
+              <a:rPr lang="en-GB" sz="1100" dirty="0" err="1">
+                <a:solidFill>
+                  <a:srgbClr val="262F3B"/>
+                </a:solidFill>
+              </a:rPr>
+              <a:t>Mgmt</a:t>
+            </a:r>
+            <a:r>
+              <a:rPr lang="en-GB" sz="1100" dirty="0">
+                <a:solidFill>
+                  <a:srgbClr val="262F3B"/>
+                </a:solidFill>
+              </a:rPr>
+              <a:t>, Azure DevOps (ADO), Octopus Deploy.</a:t>
+            </a:r>
+          </a:p>
+          <a:p>
+            <a:pPr marL="171450" indent="-171450">
+              <a:buFont typeface="Arial" panose="020B0604020202020204" pitchFamily="34" charset="0"/>
+              <a:buChar char="•"/>
+            </a:pPr>
+            <a:r>
+              <a:rPr lang="en-GB" sz="1100" dirty="0">
+                <a:solidFill>
+                  <a:srgbClr val="262F3B"/>
+                </a:solidFill>
+              </a:rPr>
               <a:t>Significantly reduced customers’ risk and lead time for SQL changes.</a:t>
             </a:r>
           </a:p>
@@ -8328,7 +8100,7 @@
                   <a:srgbClr val="262F3B"/>
                 </a:solidFill>
               </a:rPr>
-              <a:t>More detailed customer testimonials on the following page.</a:t>
+              <a:t>Customer testimonials on the following page.</a:t>
             </a:r>
           </a:p>
           <a:p>
@@ -8402,7 +8174,7 @@
                   <a:srgbClr val="262F3B"/>
                 </a:solidFill>
               </a:rPr>
-              <a:t>Promoted to director for success, responsibility, and leadership.</a:t>
+              <a:t>Promoted to director for performance, responsibility, and leadership.</a:t>
             </a:r>
             <a:endParaRPr lang="en-GB" sz="1100" dirty="0">
               <a:solidFill>
@@ -8474,7 +8246,7 @@
                   <a:srgbClr val="262F3B"/>
                 </a:solidFill>
               </a:rPr>
-              <a:t>Flourished in x-functional innovation and tech sales/implementation.</a:t>
+              <a:t>Flourished at x-functional innovation and tech sales/implementation.</a:t>
             </a:r>
           </a:p>
           <a:p>
@@ -8521,7 +8293,7 @@
           </a:p>
           <a:p>
             <a:r>
-              <a:rPr lang="en-GB" sz="1400" dirty="0">
+              <a:rPr lang="en-GB" sz="1050" dirty="0">
                 <a:solidFill>
                   <a:srgbClr val="262F3B"/>
                 </a:solidFill>
@@ -8529,18 +8301,13 @@
               <a:t> </a:t>
             </a:r>
             <a:r>
-              <a:rPr lang="en-GB" sz="700" dirty="0">
+              <a:rPr lang="en-GB" sz="600" dirty="0">
                 <a:solidFill>
                   <a:srgbClr val="262F3B"/>
                 </a:solidFill>
               </a:rPr>
               <a:t> </a:t>
             </a:r>
-            <a:endParaRPr lang="en-GB" sz="900" dirty="0">
-              <a:solidFill>
-                <a:srgbClr val="262F3B"/>
-              </a:solidFill>
-            </a:endParaRPr>
           </a:p>
           <a:p>
             <a:r>
@@ -8571,7 +8338,7 @@
         </p:nvCxnSpPr>
         <p:spPr>
           <a:xfrm>
-            <a:off x="2510720" y="4533716"/>
+            <a:off x="2510720" y="4669177"/>
             <a:ext cx="4010277" cy="0"/>
           </a:xfrm>
           <a:prstGeom prst="line">
@@ -8654,8 +8421,23 @@
                 </a:solidFill>
                 <a:latin typeface="Gill Sans Nova" panose="020B0602020104020203" pitchFamily="34" charset="0"/>
               </a:rPr>
-              <a:t>github.com/Alex-Yates/curriculum-vitae</a:t>
-            </a:r>
+              <a:t>github.com/Alex-Yates/</a:t>
+            </a:r>
+            <a:r>
+              <a:rPr lang="en-GB" sz="1100" dirty="0" err="1">
+                <a:solidFill>
+                  <a:srgbClr val="262F3B"/>
+                </a:solidFill>
+                <a:latin typeface="Gill Sans Nova" panose="020B0602020104020203" pitchFamily="34" charset="0"/>
+              </a:rPr>
+              <a:t>WordleEngine</a:t>
+            </a:r>
+            <a:endParaRPr lang="en-GB" sz="1100" dirty="0">
+              <a:solidFill>
+                <a:srgbClr val="262F3B"/>
+              </a:solidFill>
+              <a:latin typeface="Gill Sans Nova" panose="020B0602020104020203" pitchFamily="34" charset="0"/>
+            </a:endParaRPr>
           </a:p>
           <a:p>
             <a:pPr>
@@ -8670,7 +8452,7 @@
                 </a:solidFill>
                 <a:latin typeface="Gill Sans Nova" panose="020B0602020104020203" pitchFamily="34" charset="0"/>
               </a:rPr>
-              <a:t>07762618250</a:t>
+              <a:t>+44 (0)7762618250</a:t>
             </a:r>
           </a:p>
           <a:p>
@@ -8705,7 +8487,7 @@
         </p:nvGrpSpPr>
         <p:grpSpPr>
           <a:xfrm>
-            <a:off x="2427852" y="4926807"/>
+            <a:off x="2427852" y="5028399"/>
             <a:ext cx="4282308" cy="4488531"/>
             <a:chOff x="2526277" y="4893469"/>
             <a:chExt cx="4282308" cy="4488531"/>
@@ -8894,6 +8676,135 @@
           </p:pic>
         </p:grpSp>
       </p:grpSp>
+      <p:sp>
+        <p:nvSpPr>
+          <p:cNvPr id="2" name="TextBox 1">
+            <a:extLst>
+              <a:ext uri="{FF2B5EF4-FFF2-40B4-BE49-F238E27FC236}">
+                <a16:creationId xmlns:a16="http://schemas.microsoft.com/office/drawing/2014/main" id="{B27C6E78-80C3-A1E5-77DE-30F06720630F}"/>
+              </a:ext>
+            </a:extLst>
+          </p:cNvPr>
+          <p:cNvSpPr txBox="1"/>
+          <p:nvPr/>
+        </p:nvSpPr>
+        <p:spPr>
+          <a:xfrm>
+            <a:off x="185658" y="711738"/>
+            <a:ext cx="4686792" cy="1231106"/>
+          </a:xfrm>
+          <a:prstGeom prst="rect">
+            <a:avLst/>
+          </a:prstGeom>
+          <a:noFill/>
+        </p:spPr>
+        <p:txBody>
+          <a:bodyPr wrap="square" rtlCol="0">
+            <a:spAutoFit/>
+          </a:bodyPr>
+          <a:lstStyle/>
+          <a:p>
+            <a:r>
+              <a:rPr lang="en-GB" sz="1100" b="1" dirty="0">
+                <a:solidFill>
+                  <a:srgbClr val="262F3B"/>
+                </a:solidFill>
+              </a:rPr>
+              <a:t>Seeking: Snr DevOps/Platform Engineer role.</a:t>
+            </a:r>
+            <a:r>
+              <a:rPr lang="en-GB" sz="1100" dirty="0">
+                <a:solidFill>
+                  <a:srgbClr val="262F3B"/>
+                </a:solidFill>
+              </a:rPr>
+              <a:t> Hands-on with major tools (</a:t>
+            </a:r>
+            <a:r>
+              <a:rPr lang="en-GB" sz="1100" dirty="0" err="1">
+                <a:solidFill>
+                  <a:srgbClr val="262F3B"/>
+                </a:solidFill>
+              </a:rPr>
+              <a:t>IaC</a:t>
+            </a:r>
+            <a:r>
+              <a:rPr lang="en-GB" sz="1100" dirty="0">
+                <a:solidFill>
+                  <a:srgbClr val="262F3B"/>
+                </a:solidFill>
+              </a:rPr>
+              <a:t>, CI/CD, observability), languages (C#, JavaScript), and platforms (Azure, AWS).</a:t>
+            </a:r>
+          </a:p>
+          <a:p>
+            <a:r>
+              <a:rPr lang="en-GB" sz="400" dirty="0">
+                <a:solidFill>
+                  <a:srgbClr val="262F3B"/>
+                </a:solidFill>
+              </a:rPr>
+              <a:t> </a:t>
+            </a:r>
+            <a:endParaRPr lang="en-GB" sz="1100" dirty="0">
+              <a:solidFill>
+                <a:srgbClr val="262F3B"/>
+              </a:solidFill>
+            </a:endParaRPr>
+          </a:p>
+          <a:p>
+            <a:r>
+              <a:rPr lang="en-GB" sz="1100" b="1" dirty="0">
+                <a:solidFill>
+                  <a:srgbClr val="262F3B"/>
+                </a:solidFill>
+              </a:rPr>
+              <a:t>12 years of DevOps experience:</a:t>
+            </a:r>
+            <a:r>
+              <a:rPr lang="en-GB" sz="1100" dirty="0">
+                <a:solidFill>
+                  <a:srgbClr val="262F3B"/>
+                </a:solidFill>
+              </a:rPr>
+              <a:t> Helped folks to iterate tooling, process, and culture, to improve DORA metrics, and deliver better business outcomes.</a:t>
+            </a:r>
+            <a:br>
+              <a:rPr lang="en-GB" sz="1100" dirty="0">
+                <a:solidFill>
+                  <a:srgbClr val="262F3B"/>
+                </a:solidFill>
+              </a:rPr>
+            </a:br>
+            <a:r>
+              <a:rPr lang="en-GB" sz="400" dirty="0">
+                <a:solidFill>
+                  <a:srgbClr val="262F3B"/>
+                </a:solidFill>
+              </a:rPr>
+              <a:t> </a:t>
+            </a:r>
+          </a:p>
+          <a:p>
+            <a:r>
+              <a:rPr lang="en-GB" sz="1100" b="1" dirty="0">
+                <a:solidFill>
+                  <a:srgbClr val="262F3B"/>
+                </a:solidFill>
+              </a:rPr>
+              <a:t>Broad skillset:</a:t>
+            </a:r>
+            <a:r>
+              <a:rPr lang="en-GB" sz="1100" dirty="0">
+                <a:solidFill>
+                  <a:srgbClr val="262F3B"/>
+                </a:solidFill>
+              </a:rPr>
+              <a:t> DevOps engineering, consulting, training, coaching, solutions engineering, public speaking, sales, marketing, and business management.</a:t>
+            </a:r>
+          </a:p>
+        </p:txBody>
+      </p:sp>
       <p:sp>
         <p:nvSpPr>
           <p:cNvPr id="9" name="Rectangle 8">

</xml_diff>